<commit_message>
modified:   README.md 	modified:   Submission Akhir.pptx 	new file:   achmad_supriyanto-video.mp4
</commit_message>
<xml_diff>
--- a/Submission Akhir.pptx
+++ b/Submission Akhir.pptx
@@ -4809,9 +4809,31 @@
               <a:rPr lang="en-ID" b="0" dirty="0">
                 <a:effectLst/>
                 <a:latin typeface="Consolas" panose="020B0609020204030204" pitchFamily="49" charset="0"/>
-              </a:rPr>
-              <a:t>https://public.tableau.com/views/Dropout_Analytic/Dashboard1?:language=en-US&amp;publish=yes&amp;:sid=&amp;:display_count=n&amp;:origin=viz_share_link</a:t>
-            </a:r>
+                <a:hlinkClick r:id="rId3"/>
+              </a:rPr>
+              <a:t>https://public.tableau.com/views/Dropout_Analytic/Dashboard1?:language=en-US&amp;publish=yes&amp;:sid=&amp;:display_count=n&amp;:origin=viz_share</a:t>
+            </a:r>
+            <a:r>
+              <a:rPr lang="en-ID" b="0">
+                <a:effectLst/>
+                <a:latin typeface="Consolas" panose="020B0609020204030204" pitchFamily="49" charset="0"/>
+                <a:hlinkClick r:id="rId3"/>
+              </a:rPr>
+              <a:t>_link</a:t>
+            </a:r>
+            <a:endParaRPr lang="en-ID" b="0">
+              <a:effectLst/>
+              <a:latin typeface="Consolas" panose="020B0609020204030204" pitchFamily="49" charset="0"/>
+            </a:endParaRPr>
+          </a:p>
+          <a:p>
+            <a:pPr marL="0" indent="0">
+              <a:buNone/>
+            </a:pPr>
+            <a:endParaRPr lang="en-ID" b="0" dirty="0">
+              <a:effectLst/>
+              <a:latin typeface="Consolas" panose="020B0609020204030204" pitchFamily="49" charset="0"/>
+            </a:endParaRPr>
           </a:p>
           <a:p>
             <a:pPr marL="0" indent="0" algn="ctr">

</xml_diff>